<commit_message>
Adopt current tables from html file.
</commit_message>
<xml_diff>
--- a/presentation/presentation.pptx
+++ b/presentation/presentation.pptx
@@ -352,7 +352,7 @@
           <a:p>
             <a:fld id="{A2080032-F193-46E6-9750-68B93E0B4527}" type="slidenum">
               <a:rPr lang="de-AT" smtClean="0"/>
-              <a:t>‹Nr.›</a:t>
+              <a:t>‹#›</a:t>
             </a:fld>
             <a:endParaRPr lang="de-AT"/>
           </a:p>
@@ -788,7 +788,7 @@
           <a:p>
             <a:fld id="{A2080032-F193-46E6-9750-68B93E0B4527}" type="slidenum">
               <a:rPr lang="de-AT" smtClean="0"/>
-              <a:t>‹Nr.›</a:t>
+              <a:t>‹#›</a:t>
             </a:fld>
             <a:endParaRPr lang="de-AT"/>
           </a:p>
@@ -1038,7 +1038,7 @@
           <a:p>
             <a:fld id="{A2080032-F193-46E6-9750-68B93E0B4527}" type="slidenum">
               <a:rPr lang="de-AT" smtClean="0"/>
-              <a:t>‹Nr.›</a:t>
+              <a:t>‹#›</a:t>
             </a:fld>
             <a:endParaRPr lang="de-AT"/>
           </a:p>
@@ -1346,7 +1346,7 @@
           <a:p>
             <a:fld id="{A2080032-F193-46E6-9750-68B93E0B4527}" type="slidenum">
               <a:rPr lang="de-AT" smtClean="0"/>
-              <a:t>‹Nr.›</a:t>
+              <a:t>‹#›</a:t>
             </a:fld>
             <a:endParaRPr lang="de-AT"/>
           </a:p>
@@ -1664,7 +1664,7 @@
           <a:p>
             <a:fld id="{A2080032-F193-46E6-9750-68B93E0B4527}" type="slidenum">
               <a:rPr lang="de-AT" smtClean="0"/>
-              <a:t>‹Nr.›</a:t>
+              <a:t>‹#›</a:t>
             </a:fld>
             <a:endParaRPr lang="de-AT"/>
           </a:p>
@@ -1966,7 +1966,7 @@
           <a:p>
             <a:fld id="{A2080032-F193-46E6-9750-68B93E0B4527}" type="slidenum">
               <a:rPr lang="de-AT" smtClean="0"/>
-              <a:t>‹Nr.›</a:t>
+              <a:t>‹#›</a:t>
             </a:fld>
             <a:endParaRPr lang="de-AT"/>
           </a:p>
@@ -2333,7 +2333,7 @@
           <a:p>
             <a:fld id="{A2080032-F193-46E6-9750-68B93E0B4527}" type="slidenum">
               <a:rPr lang="de-AT" smtClean="0"/>
-              <a:t>‹Nr.›</a:t>
+              <a:t>‹#›</a:t>
             </a:fld>
             <a:endParaRPr lang="de-AT"/>
           </a:p>
@@ -2507,7 +2507,7 @@
           <a:p>
             <a:fld id="{A2080032-F193-46E6-9750-68B93E0B4527}" type="slidenum">
               <a:rPr lang="de-AT" smtClean="0"/>
-              <a:t>‹Nr.›</a:t>
+              <a:t>‹#›</a:t>
             </a:fld>
             <a:endParaRPr lang="de-AT"/>
           </a:p>
@@ -2687,7 +2687,7 @@
           <a:p>
             <a:fld id="{A2080032-F193-46E6-9750-68B93E0B4527}" type="slidenum">
               <a:rPr lang="de-AT" smtClean="0"/>
-              <a:t>‹Nr.›</a:t>
+              <a:t>‹#›</a:t>
             </a:fld>
             <a:endParaRPr lang="de-AT"/>
           </a:p>
@@ -2857,7 +2857,7 @@
           <a:p>
             <a:fld id="{A2080032-F193-46E6-9750-68B93E0B4527}" type="slidenum">
               <a:rPr lang="de-AT" smtClean="0"/>
-              <a:t>‹Nr.›</a:t>
+              <a:t>‹#›</a:t>
             </a:fld>
             <a:endParaRPr lang="de-AT"/>
           </a:p>
@@ -3107,7 +3107,7 @@
           <a:p>
             <a:fld id="{A2080032-F193-46E6-9750-68B93E0B4527}" type="slidenum">
               <a:rPr lang="de-AT" smtClean="0"/>
-              <a:t>‹Nr.›</a:t>
+              <a:t>‹#›</a:t>
             </a:fld>
             <a:endParaRPr lang="de-AT"/>
           </a:p>
@@ -3343,7 +3343,7 @@
           <a:p>
             <a:fld id="{A2080032-F193-46E6-9750-68B93E0B4527}" type="slidenum">
               <a:rPr lang="de-AT" smtClean="0"/>
-              <a:t>‹Nr.›</a:t>
+              <a:t>‹#›</a:t>
             </a:fld>
             <a:endParaRPr lang="de-AT"/>
           </a:p>
@@ -3725,7 +3725,7 @@
           <a:p>
             <a:fld id="{A2080032-F193-46E6-9750-68B93E0B4527}" type="slidenum">
               <a:rPr lang="de-AT" smtClean="0"/>
-              <a:t>‹Nr.›</a:t>
+              <a:t>‹#›</a:t>
             </a:fld>
             <a:endParaRPr lang="de-AT"/>
           </a:p>
@@ -3843,7 +3843,7 @@
           <a:p>
             <a:fld id="{A2080032-F193-46E6-9750-68B93E0B4527}" type="slidenum">
               <a:rPr lang="de-AT" smtClean="0"/>
-              <a:t>‹Nr.›</a:t>
+              <a:t>‹#›</a:t>
             </a:fld>
             <a:endParaRPr lang="de-AT"/>
           </a:p>
@@ -3938,7 +3938,7 @@
           <a:p>
             <a:fld id="{A2080032-F193-46E6-9750-68B93E0B4527}" type="slidenum">
               <a:rPr lang="de-AT" smtClean="0"/>
-              <a:t>‹Nr.›</a:t>
+              <a:t>‹#›</a:t>
             </a:fld>
             <a:endParaRPr lang="de-AT"/>
           </a:p>
@@ -4193,7 +4193,7 @@
           <a:p>
             <a:fld id="{A2080032-F193-46E6-9750-68B93E0B4527}" type="slidenum">
               <a:rPr lang="de-AT" smtClean="0"/>
-              <a:t>‹Nr.›</a:t>
+              <a:t>‹#›</a:t>
             </a:fld>
             <a:endParaRPr lang="de-AT"/>
           </a:p>
@@ -4476,7 +4476,7 @@
           <a:p>
             <a:fld id="{A2080032-F193-46E6-9750-68B93E0B4527}" type="slidenum">
               <a:rPr lang="de-AT" smtClean="0"/>
-              <a:t>‹Nr.›</a:t>
+              <a:t>‹#›</a:t>
             </a:fld>
             <a:endParaRPr lang="de-AT"/>
           </a:p>
@@ -4922,7 +4922,7 @@
           <a:p>
             <a:fld id="{A2080032-F193-46E6-9750-68B93E0B4527}" type="slidenum">
               <a:rPr lang="de-AT" smtClean="0"/>
-              <a:t>‹Nr.›</a:t>
+              <a:t>‹#›</a:t>
             </a:fld>
             <a:endParaRPr lang="de-AT"/>
           </a:p>
@@ -5443,7 +5443,17 @@
                 <a:effectLst/>
                 <a:latin typeface="Verdana" panose="020B0604030504040204" pitchFamily="34" charset="0"/>
               </a:rPr>
-              <a:t>Manuel Sammer, Lukas Kloiber, Marius Laffer, …</a:t>
+              <a:t>Manuel Sammer, Lukas Kloiber, Marius Laffer, </a:t>
+            </a:r>
+            <a:r>
+              <a:rPr lang="en-AT" b="1" i="0" dirty="0">
+                <a:solidFill>
+                  <a:srgbClr val="000000"/>
+                </a:solidFill>
+                <a:effectLst/>
+                <a:latin typeface="Verdana" panose="020B0604030504040204" pitchFamily="34" charset="0"/>
+              </a:rPr>
+              <a:t>Manuel Moser</a:t>
             </a:r>
             <a:endParaRPr lang="de-AT" dirty="0"/>
           </a:p>
@@ -6285,7 +6295,7 @@
             <p:ph idx="1"/>
             <p:extLst>
               <p:ext uri="{D42A27DB-BD31-4B8C-83A1-F6EECF244321}">
-                <p14:modId xmlns:p14="http://schemas.microsoft.com/office/powerpoint/2010/main" val="1616681297"/>
+                <p14:modId xmlns:p14="http://schemas.microsoft.com/office/powerpoint/2010/main" val="214260766"/>
               </p:ext>
             </p:extLst>
           </p:nvPr>
@@ -9750,7 +9760,7 @@
                         </a:spcAft>
                       </a:pPr>
                       <a:r>
-                        <a:rPr lang="de-AT" sz="900" b="0" i="0" u="none" strike="noStrike">
+                        <a:rPr lang="de-AT" sz="900" b="0" i="0" u="none" strike="noStrike" dirty="0">
                           <a:effectLst/>
                           <a:latin typeface="Arial" panose="020B0604020202020204" pitchFamily="34" charset="0"/>
                         </a:rPr>
@@ -10086,12 +10096,26 @@
                         </a:spcAft>
                       </a:pPr>
                       <a:r>
-                        <a:rPr lang="de-AT" sz="900" b="0" i="0" u="none" strike="noStrike">
+                        <a:rPr lang="en-US" sz="900" b="0" i="0" u="none" strike="noStrike" kern="1200" dirty="0">
+                          <a:solidFill>
+                            <a:schemeClr val="tx1"/>
+                          </a:solidFill>
                           <a:effectLst/>
                           <a:latin typeface="Arial" panose="020B0604020202020204" pitchFamily="34" charset="0"/>
+                          <a:ea typeface="+mn-ea"/>
+                          <a:cs typeface="+mn-cs"/>
                         </a:rPr>
-                        <a:t>2349x1080</a:t>
+                        <a:t>1080x2349</a:t>
                       </a:r>
+                      <a:endParaRPr lang="de-AT" sz="900" b="0" i="0" u="none" strike="noStrike" kern="1200" dirty="0">
+                        <a:solidFill>
+                          <a:schemeClr val="tx1"/>
+                        </a:solidFill>
+                        <a:effectLst/>
+                        <a:latin typeface="Arial" panose="020B0604020202020204" pitchFamily="34" charset="0"/>
+                        <a:ea typeface="+mn-ea"/>
+                        <a:cs typeface="+mn-cs"/>
+                      </a:endParaRPr>
                     </a:p>
                   </a:txBody>
                   <a:tcPr marL="46577" marR="46577" marT="23289" marB="23289">
@@ -10147,11 +10171,25 @@
                         </a:spcAft>
                       </a:pPr>
                       <a:r>
-                        <a:rPr lang="de-AT" sz="900" b="0" i="0" u="none" strike="noStrike">
+                        <a:rPr lang="de-AT" sz="900" b="0" i="0" u="none" strike="noStrike" dirty="0">
                           <a:effectLst/>
                           <a:latin typeface="Arial" panose="020B0604020202020204" pitchFamily="34" charset="0"/>
                         </a:rPr>
-                        <a:t>3120×1440</a:t>
+                        <a:t>1440</a:t>
+                      </a:r>
+                      <a:r>
+                        <a:rPr lang="en-AT" sz="900" b="0" i="0" u="none" strike="noStrike" dirty="0">
+                          <a:effectLst/>
+                          <a:latin typeface="Arial" panose="020B0604020202020204" pitchFamily="34" charset="0"/>
+                        </a:rPr>
+                        <a:t>x</a:t>
+                      </a:r>
+                      <a:r>
+                        <a:rPr lang="de-AT" sz="900" b="0" i="0" u="none" strike="noStrike" dirty="0">
+                          <a:effectLst/>
+                          <a:latin typeface="Arial" panose="020B0604020202020204" pitchFamily="34" charset="0"/>
+                        </a:rPr>
+                        <a:t>3120</a:t>
                       </a:r>
                     </a:p>
                   </a:txBody>
@@ -10208,12 +10246,16 @@
                         </a:spcAft>
                       </a:pPr>
                       <a:r>
-                        <a:rPr lang="de-AT" sz="900" b="0" i="0" u="none" strike="noStrike" dirty="0">
+                        <a:rPr lang="en-AT" sz="900" b="0" i="0" u="none" strike="noStrike" dirty="0">
                           <a:effectLst/>
                           <a:latin typeface="Arial" panose="020B0604020202020204" pitchFamily="34" charset="0"/>
                         </a:rPr>
-                        <a:t>414×702</a:t>
+                        <a:t>1080x2300</a:t>
                       </a:r>
+                      <a:endParaRPr lang="de-AT" sz="900" b="0" i="0" u="none" strike="noStrike" dirty="0">
+                        <a:effectLst/>
+                        <a:latin typeface="Arial" panose="020B0604020202020204" pitchFamily="34" charset="0"/>
+                      </a:endParaRPr>
                     </a:p>
                   </a:txBody>
                   <a:tcPr marL="46577" marR="46577" marT="23289" marB="23289">
@@ -10269,11 +10311,25 @@
                         </a:spcAft>
                       </a:pPr>
                       <a:r>
-                        <a:rPr lang="de-AT" sz="900" b="0" i="0" u="none" strike="noStrike">
+                        <a:rPr lang="de-AT" sz="900" b="0" i="0" u="none" strike="noStrike" dirty="0">
                           <a:effectLst/>
                           <a:latin typeface="Arial" panose="020B0604020202020204" pitchFamily="34" charset="0"/>
                         </a:rPr>
-                        <a:t>2160x1620</a:t>
+                        <a:t>1620</a:t>
+                      </a:r>
+                      <a:r>
+                        <a:rPr lang="en-AT" sz="900" b="0" i="0" u="none" strike="noStrike" dirty="0">
+                          <a:effectLst/>
+                          <a:latin typeface="Arial" panose="020B0604020202020204" pitchFamily="34" charset="0"/>
+                        </a:rPr>
+                        <a:t>x</a:t>
+                      </a:r>
+                      <a:r>
+                        <a:rPr lang="de-AT" sz="900" b="0" i="0" u="none" strike="noStrike" dirty="0">
+                          <a:effectLst/>
+                          <a:latin typeface="Arial" panose="020B0604020202020204" pitchFamily="34" charset="0"/>
+                        </a:rPr>
+                        <a:t>2160</a:t>
                       </a:r>
                     </a:p>
                   </a:txBody>
@@ -10411,12 +10467,16 @@
                         </a:spcAft>
                       </a:pPr>
                       <a:r>
-                        <a:rPr lang="de-AT" sz="900" b="0" i="0" u="none" strike="noStrike">
+                        <a:rPr lang="en-AT" sz="900" b="0" i="0" u="none" strike="noStrike" dirty="0">
                           <a:effectLst/>
                           <a:latin typeface="Arial" panose="020B0604020202020204" pitchFamily="34" charset="0"/>
                         </a:rPr>
-                        <a:t>tbd</a:t>
+                        <a:t>AZ Screen recorder</a:t>
                       </a:r>
+                      <a:endParaRPr lang="de-AT" sz="900" b="0" i="0" u="none" strike="noStrike" dirty="0">
+                        <a:effectLst/>
+                        <a:latin typeface="Arial" panose="020B0604020202020204" pitchFamily="34" charset="0"/>
+                      </a:endParaRPr>
                     </a:p>
                   </a:txBody>
                   <a:tcPr marL="46577" marR="46577" marT="23289" marB="23289">
@@ -10472,12 +10532,16 @@
                         </a:spcAft>
                       </a:pPr>
                       <a:r>
-                        <a:rPr lang="de-AT" sz="900" b="0" i="0" u="none" strike="noStrike">
+                        <a:rPr lang="en-AT" sz="900" b="0" i="0" u="none" strike="noStrike" dirty="0">
                           <a:effectLst/>
                           <a:latin typeface="Arial" panose="020B0604020202020204" pitchFamily="34" charset="0"/>
                         </a:rPr>
-                        <a:t>Android Screen Capture</a:t>
+                        <a:t>AZ Screen recorder</a:t>
                       </a:r>
+                      <a:endParaRPr lang="de-AT" sz="900" b="0" i="0" u="none" strike="noStrike" dirty="0">
+                        <a:effectLst/>
+                        <a:latin typeface="Arial" panose="020B0604020202020204" pitchFamily="34" charset="0"/>
+                      </a:endParaRPr>
                     </a:p>
                   </a:txBody>
                   <a:tcPr marL="46577" marR="46577" marT="23289" marB="23289">
@@ -11297,7 +11361,7 @@
             <p:ph idx="1"/>
             <p:extLst>
               <p:ext uri="{D42A27DB-BD31-4B8C-83A1-F6EECF244321}">
-                <p14:modId xmlns:p14="http://schemas.microsoft.com/office/powerpoint/2010/main" val="3369342158"/>
+                <p14:modId xmlns:p14="http://schemas.microsoft.com/office/powerpoint/2010/main" val="1409979482"/>
               </p:ext>
             </p:extLst>
           </p:nvPr>
@@ -13223,7 +13287,31 @@
                           <a:ea typeface="+mn-ea"/>
                           <a:cs typeface="+mn-cs"/>
                         </a:rPr>
-                        <a:t>21"</a:t>
+                        <a:t>2</a:t>
+                      </a:r>
+                      <a:r>
+                        <a:rPr lang="en-AT" sz="900" b="0" i="0" u="none" strike="noStrike" kern="1200" dirty="0">
+                          <a:solidFill>
+                            <a:schemeClr val="tx1"/>
+                          </a:solidFill>
+                          <a:effectLst/>
+                          <a:latin typeface="Arial" panose="020B0604020202020204" pitchFamily="34" charset="0"/>
+                          <a:ea typeface="+mn-ea"/>
+                          <a:cs typeface="+mn-cs"/>
+                        </a:rPr>
+                        <a:t>7</a:t>
+                      </a:r>
+                      <a:r>
+                        <a:rPr lang="de-AT" sz="900" b="0" i="0" u="none" strike="noStrike" kern="1200" dirty="0">
+                          <a:solidFill>
+                            <a:schemeClr val="tx1"/>
+                          </a:solidFill>
+                          <a:effectLst/>
+                          <a:latin typeface="Arial" panose="020B0604020202020204" pitchFamily="34" charset="0"/>
+                          <a:ea typeface="+mn-ea"/>
+                          <a:cs typeface="+mn-cs"/>
+                        </a:rPr>
+                        <a:t>"</a:t>
                       </a:r>
                     </a:p>
                   </a:txBody>
@@ -13700,7 +13788,7 @@
                           <a:ea typeface="+mn-ea"/>
                           <a:cs typeface="+mn-cs"/>
                         </a:rPr>
-                        <a:t>1920x1080</a:t>
+                        <a:t>2560x1440</a:t>
                       </a:r>
                     </a:p>
                   </a:txBody>
@@ -14249,7 +14337,7 @@
                         </a:spcAft>
                       </a:pPr>
                       <a:r>
-                        <a:rPr lang="de-AT" sz="900" b="0" i="0" u="none" strike="noStrike" kern="1200" dirty="0" err="1">
+                        <a:rPr lang="en-AT" sz="900" b="0" i="0" u="none" strike="noStrike" kern="1200" dirty="0" err="1">
                           <a:solidFill>
                             <a:schemeClr val="tx1"/>
                           </a:solidFill>
@@ -14258,7 +14346,7 @@
                           <a:ea typeface="+mn-ea"/>
                           <a:cs typeface="+mn-cs"/>
                         </a:rPr>
-                        <a:t>tbd</a:t>
+                        <a:t>AdblockPlus</a:t>
                       </a:r>
                       <a:endParaRPr lang="de-AT" sz="900" b="0" i="0" u="none" strike="noStrike" kern="1200" dirty="0">
                         <a:solidFill>
@@ -15539,7 +15627,7 @@
                         </a:spcAft>
                       </a:pPr>
                       <a:r>
-                        <a:rPr lang="de-AT" sz="900" b="0" i="0" u="none" strike="noStrike" kern="1200" dirty="0">
+                        <a:rPr lang="en-AT" sz="900" b="0" i="0" u="none" strike="noStrike" kern="1200" dirty="0">
                           <a:solidFill>
                             <a:schemeClr val="tx1"/>
                           </a:solidFill>
@@ -15548,8 +15636,17 @@
                           <a:ea typeface="+mn-ea"/>
                           <a:cs typeface="+mn-cs"/>
                         </a:rPr>
-                        <a:t>2560×1320</a:t>
+                        <a:t>1920x1080</a:t>
                       </a:r>
+                      <a:endParaRPr lang="de-AT" sz="900" b="0" i="0" u="none" strike="noStrike" kern="1200" dirty="0">
+                        <a:solidFill>
+                          <a:schemeClr val="tx1"/>
+                        </a:solidFill>
+                        <a:effectLst/>
+                        <a:latin typeface="Arial" panose="020B0604020202020204" pitchFamily="34" charset="0"/>
+                        <a:ea typeface="+mn-ea"/>
+                        <a:cs typeface="+mn-cs"/>
+                      </a:endParaRPr>
                     </a:p>
                   </a:txBody>
                   <a:tcPr anchor="ctr">
@@ -15752,7 +15849,7 @@
                         </a:spcAft>
                       </a:pPr>
                       <a:r>
-                        <a:rPr lang="de-AT" sz="900" b="0" i="0" u="none" strike="noStrike" kern="1200">
+                        <a:rPr lang="de-AT" sz="900" b="0" i="0" u="none" strike="noStrike" kern="1200" dirty="0">
                           <a:solidFill>
                             <a:schemeClr val="tx1"/>
                           </a:solidFill>
@@ -15761,8 +15858,29 @@
                           <a:ea typeface="+mn-ea"/>
                           <a:cs typeface="+mn-cs"/>
                         </a:rPr>
-                        <a:t>OBS Studio xx.xx.xx</a:t>
+                        <a:t>OBS Studio </a:t>
                       </a:r>
+                      <a:r>
+                        <a:rPr lang="en-AT" sz="900" b="0" i="0" u="none" strike="noStrike" kern="1200" dirty="0">
+                          <a:solidFill>
+                            <a:schemeClr val="tx1"/>
+                          </a:solidFill>
+                          <a:effectLst/>
+                          <a:latin typeface="Arial" panose="020B0604020202020204" pitchFamily="34" charset="0"/>
+                          <a:ea typeface="+mn-ea"/>
+                          <a:cs typeface="+mn-cs"/>
+                        </a:rPr>
+                        <a:t>26.1.1</a:t>
+                      </a:r>
+                      <a:endParaRPr lang="de-AT" sz="900" b="0" i="0" u="none" strike="noStrike" kern="1200" dirty="0">
+                        <a:solidFill>
+                          <a:schemeClr val="tx1"/>
+                        </a:solidFill>
+                        <a:effectLst/>
+                        <a:latin typeface="Arial" panose="020B0604020202020204" pitchFamily="34" charset="0"/>
+                        <a:ea typeface="+mn-ea"/>
+                        <a:cs typeface="+mn-cs"/>
+                      </a:endParaRPr>
                     </a:p>
                   </a:txBody>
                   <a:tcPr anchor="ctr">
@@ -15818,7 +15936,7 @@
                         </a:spcAft>
                       </a:pPr>
                       <a:r>
-                        <a:rPr lang="de-AT" sz="900" b="0" i="0" u="none" strike="noStrike" kern="1200" dirty="0" err="1">
+                        <a:rPr lang="en-AT" sz="900" b="0" i="0" u="none" strike="noStrike" kern="1200" dirty="0" err="1">
                           <a:solidFill>
                             <a:schemeClr val="tx1"/>
                           </a:solidFill>
@@ -15827,10 +15945,10 @@
                           <a:ea typeface="+mn-ea"/>
                           <a:cs typeface="+mn-cs"/>
                         </a:rPr>
-                        <a:t>Nvidia</a:t>
+                        <a:t>Obs</a:t>
                       </a:r>
                       <a:r>
-                        <a:rPr lang="de-AT" sz="900" b="0" i="0" u="none" strike="noStrike" kern="1200" dirty="0">
+                        <a:rPr lang="en-AT" sz="900" b="0" i="0" u="none" strike="noStrike" kern="1200" dirty="0">
                           <a:solidFill>
                             <a:schemeClr val="tx1"/>
                           </a:solidFill>
@@ -15839,19 +15957,7 @@
                           <a:ea typeface="+mn-ea"/>
                           <a:cs typeface="+mn-cs"/>
                         </a:rPr>
-                        <a:t> </a:t>
-                      </a:r>
-                      <a:r>
-                        <a:rPr lang="de-AT" sz="900" b="0" i="0" u="none" strike="noStrike" kern="1200" dirty="0" err="1">
-                          <a:solidFill>
-                            <a:schemeClr val="tx1"/>
-                          </a:solidFill>
-                          <a:effectLst/>
-                          <a:latin typeface="Arial" panose="020B0604020202020204" pitchFamily="34" charset="0"/>
-                          <a:ea typeface="+mn-ea"/>
-                          <a:cs typeface="+mn-cs"/>
-                        </a:rPr>
-                        <a:t>Shadowplay</a:t>
+                        <a:t> Studio 18.0.1</a:t>
                       </a:r>
                       <a:endParaRPr lang="de-AT" sz="900" b="0" i="0" u="none" strike="noStrike" kern="1200" dirty="0">
                         <a:solidFill>
@@ -17009,9 +17115,21 @@
           <a:lstStyle/>
           <a:p>
             <a:r>
-              <a:rPr lang="de-AT" dirty="0"/>
-              <a:t>Vielen Danke für Ihre Aufmerksamkeit</a:t>
-            </a:r>
+              <a:rPr lang="en-US" dirty="0"/>
+              <a:t>T</a:t>
+            </a:r>
+            <a:r>
+              <a:rPr lang="en-AT" dirty="0"/>
+              <a:t>hank you </a:t>
+            </a:r>
+            <a:br>
+              <a:rPr lang="en-AT" dirty="0"/>
+            </a:br>
+            <a:r>
+              <a:rPr lang="en-AT" dirty="0"/>
+              <a:t>for your attention</a:t>
+            </a:r>
+            <a:endParaRPr lang="de-AT" dirty="0"/>
           </a:p>
         </p:txBody>
       </p:sp>

</xml_diff>